<commit_message>
Corrected typo in APL example
</commit_message>
<xml_diff>
--- a/Intro.pptx
+++ b/Intro.pptx
@@ -228,7 +228,7 @@
           <a:p>
             <a:fld id="{CDEAEF8A-5BB8-41C8-B8C2-160617C17EF4}" type="datetimeFigureOut">
               <a:rPr lang="en-GB" smtClean="0"/>
-              <a:t>02/07/2018</a:t>
+              <a:t>04/07/2018</a:t>
             </a:fld>
             <a:endParaRPr lang="en-GB"/>
           </a:p>
@@ -4638,7 +4638,7 @@
               <a:rPr lang="es-ES" sz="1600" dirty="0">
                 <a:latin typeface="APL385 Unicode" panose="020B0709000202000203" pitchFamily="49" charset="0"/>
               </a:rPr>
-              <a:t>0.1 0.2 0.3</a:t>
+              <a:t>0.1 0 0.3</a:t>
             </a:r>
           </a:p>
           <a:p>

</xml_diff>